<commit_message>
updated a session1 slide
</commit_message>
<xml_diff>
--- a/Session01/Session1_Slides.pptx
+++ b/Session01/Session1_Slides.pptx
@@ -5422,7 +5422,7 @@
           </a:ln>
           <a:extLst>
             <a:ext uri="{C572A759-6A51-4108-AA02-DFA0A04FC94B}">
-              <ma14:wrappingTextBoxFlag xmlns="" xmlns:ma14="http://schemas.microsoft.com/office/mac/drawingml/2011/main" val="1"/>
+              <ma14:wrappingTextBoxFlag xmlns:ma14="http://schemas.microsoft.com/office/mac/drawingml/2011/main" xmlns="" val="1"/>
             </a:ext>
           </a:extLst>
         </p:spPr>
@@ -5461,7 +5461,7 @@
           </a:ln>
           <a:extLst>
             <a:ext uri="{C572A759-6A51-4108-AA02-DFA0A04FC94B}">
-              <ma14:wrappingTextBoxFlag xmlns="" xmlns:ma14="http://schemas.microsoft.com/office/mac/drawingml/2011/main" val="1"/>
+              <ma14:wrappingTextBoxFlag xmlns:ma14="http://schemas.microsoft.com/office/mac/drawingml/2011/main" xmlns="" val="1"/>
             </a:ext>
           </a:extLst>
         </p:spPr>
@@ -6655,7 +6655,7 @@
           </a:ln>
           <a:extLst>
             <a:ext uri="{C572A759-6A51-4108-AA02-DFA0A04FC94B}">
-              <ma14:wrappingTextBoxFlag xmlns="" xmlns:ma14="http://schemas.microsoft.com/office/mac/drawingml/2011/main" val="1"/>
+              <ma14:wrappingTextBoxFlag xmlns:ma14="http://schemas.microsoft.com/office/mac/drawingml/2011/main" xmlns="" val="1"/>
             </a:ext>
           </a:extLst>
         </p:spPr>
@@ -6704,7 +6704,7 @@
           </a:ln>
           <a:extLst>
             <a:ext uri="{C572A759-6A51-4108-AA02-DFA0A04FC94B}">
-              <ma14:wrappingTextBoxFlag xmlns="" xmlns:ma14="http://schemas.microsoft.com/office/mac/drawingml/2011/main" val="1"/>
+              <ma14:wrappingTextBoxFlag xmlns:ma14="http://schemas.microsoft.com/office/mac/drawingml/2011/main" xmlns="" val="1"/>
             </a:ext>
           </a:extLst>
         </p:spPr>
@@ -6815,7 +6815,7 @@
           </a:ln>
           <a:extLst>
             <a:ext uri="{C572A759-6A51-4108-AA02-DFA0A04FC94B}">
-              <ma14:wrappingTextBoxFlag xmlns="" xmlns:ma14="http://schemas.microsoft.com/office/mac/drawingml/2011/main" val="1"/>
+              <ma14:wrappingTextBoxFlag xmlns:ma14="http://schemas.microsoft.com/office/mac/drawingml/2011/main" xmlns="" val="1"/>
             </a:ext>
           </a:extLst>
         </p:spPr>
@@ -6862,7 +6862,7 @@
           </a:ln>
           <a:extLst>
             <a:ext uri="{C572A759-6A51-4108-AA02-DFA0A04FC94B}">
-              <ma14:wrappingTextBoxFlag xmlns="" xmlns:ma14="http://schemas.microsoft.com/office/mac/drawingml/2011/main" val="1"/>
+              <ma14:wrappingTextBoxFlag xmlns:ma14="http://schemas.microsoft.com/office/mac/drawingml/2011/main" xmlns="" val="1"/>
             </a:ext>
           </a:extLst>
         </p:spPr>
@@ -6963,7 +6963,7 @@
           </a:ln>
           <a:extLst>
             <a:ext uri="{C572A759-6A51-4108-AA02-DFA0A04FC94B}">
-              <ma14:wrappingTextBoxFlag xmlns="" xmlns:ma14="http://schemas.microsoft.com/office/mac/drawingml/2011/main" val="1"/>
+              <ma14:wrappingTextBoxFlag xmlns:ma14="http://schemas.microsoft.com/office/mac/drawingml/2011/main" xmlns="" val="1"/>
             </a:ext>
           </a:extLst>
         </p:spPr>
@@ -7117,7 +7117,7 @@
           </a:ln>
           <a:extLst>
             <a:ext uri="{C572A759-6A51-4108-AA02-DFA0A04FC94B}">
-              <ma14:wrappingTextBoxFlag xmlns="" xmlns:ma14="http://schemas.microsoft.com/office/mac/drawingml/2011/main" val="1"/>
+              <ma14:wrappingTextBoxFlag xmlns:ma14="http://schemas.microsoft.com/office/mac/drawingml/2011/main" xmlns="" val="1"/>
             </a:ext>
           </a:extLst>
         </p:spPr>
@@ -7164,7 +7164,7 @@
           </a:ln>
           <a:extLst>
             <a:ext uri="{C572A759-6A51-4108-AA02-DFA0A04FC94B}">
-              <ma14:wrappingTextBoxFlag xmlns="" xmlns:ma14="http://schemas.microsoft.com/office/mac/drawingml/2011/main" val="1"/>
+              <ma14:wrappingTextBoxFlag xmlns:ma14="http://schemas.microsoft.com/office/mac/drawingml/2011/main" xmlns="" val="1"/>
             </a:ext>
           </a:extLst>
         </p:spPr>
@@ -7256,7 +7256,7 @@
           </a:ln>
           <a:extLst>
             <a:ext uri="{C572A759-6A51-4108-AA02-DFA0A04FC94B}">
-              <ma14:wrappingTextBoxFlag xmlns="" xmlns:ma14="http://schemas.microsoft.com/office/mac/drawingml/2011/main" val="1"/>
+              <ma14:wrappingTextBoxFlag xmlns:ma14="http://schemas.microsoft.com/office/mac/drawingml/2011/main" xmlns="" val="1"/>
             </a:ext>
           </a:extLst>
         </p:spPr>
@@ -7463,7 +7463,7 @@
           </a:ln>
           <a:extLst>
             <a:ext uri="{C572A759-6A51-4108-AA02-DFA0A04FC94B}">
-              <ma14:wrappingTextBoxFlag xmlns="" xmlns:ma14="http://schemas.microsoft.com/office/mac/drawingml/2011/main" val="1"/>
+              <ma14:wrappingTextBoxFlag xmlns:ma14="http://schemas.microsoft.com/office/mac/drawingml/2011/main" xmlns="" val="1"/>
             </a:ext>
           </a:extLst>
         </p:spPr>
@@ -7572,7 +7572,7 @@
           </a:ln>
           <a:extLst>
             <a:ext uri="{C572A759-6A51-4108-AA02-DFA0A04FC94B}">
-              <ma14:wrappingTextBoxFlag xmlns="" xmlns:ma14="http://schemas.microsoft.com/office/mac/drawingml/2011/main" val="1"/>
+              <ma14:wrappingTextBoxFlag xmlns:ma14="http://schemas.microsoft.com/office/mac/drawingml/2011/main" xmlns="" val="1"/>
             </a:ext>
           </a:extLst>
         </p:spPr>
@@ -7765,7 +7765,7 @@
           </a:ln>
           <a:extLst>
             <a:ext uri="{C572A759-6A51-4108-AA02-DFA0A04FC94B}">
-              <ma14:wrappingTextBoxFlag xmlns="" xmlns:ma14="http://schemas.microsoft.com/office/mac/drawingml/2011/main" val="1"/>
+              <ma14:wrappingTextBoxFlag xmlns:ma14="http://schemas.microsoft.com/office/mac/drawingml/2011/main" xmlns="" val="1"/>
             </a:ext>
           </a:extLst>
         </p:spPr>
@@ -7896,7 +7896,7 @@
           </a:ln>
           <a:extLst>
             <a:ext uri="{C572A759-6A51-4108-AA02-DFA0A04FC94B}">
-              <ma14:wrappingTextBoxFlag xmlns="" xmlns:ma14="http://schemas.microsoft.com/office/mac/drawingml/2011/main" val="1"/>
+              <ma14:wrappingTextBoxFlag xmlns:ma14="http://schemas.microsoft.com/office/mac/drawingml/2011/main" xmlns="" val="1"/>
             </a:ext>
           </a:extLst>
         </p:spPr>
@@ -8005,7 +8005,7 @@
           </a:ln>
           <a:extLst>
             <a:ext uri="{C572A759-6A51-4108-AA02-DFA0A04FC94B}">
-              <ma14:wrappingTextBoxFlag xmlns="" xmlns:ma14="http://schemas.microsoft.com/office/mac/drawingml/2011/main" val="1"/>
+              <ma14:wrappingTextBoxFlag xmlns:ma14="http://schemas.microsoft.com/office/mac/drawingml/2011/main" xmlns="" val="1"/>
             </a:ext>
           </a:extLst>
         </p:spPr>
@@ -8136,7 +8136,7 @@
           </a:ln>
           <a:extLst>
             <a:ext uri="{C572A759-6A51-4108-AA02-DFA0A04FC94B}">
-              <ma14:wrappingTextBoxFlag xmlns="" xmlns:ma14="http://schemas.microsoft.com/office/mac/drawingml/2011/main" val="1"/>
+              <ma14:wrappingTextBoxFlag xmlns:ma14="http://schemas.microsoft.com/office/mac/drawingml/2011/main" xmlns="" val="1"/>
             </a:ext>
           </a:extLst>
         </p:spPr>
@@ -8441,7 +8441,7 @@
           </a:ln>
           <a:extLst>
             <a:ext uri="{C572A759-6A51-4108-AA02-DFA0A04FC94B}">
-              <ma14:wrappingTextBoxFlag xmlns="" xmlns:ma14="http://schemas.microsoft.com/office/mac/drawingml/2011/main" val="1"/>
+              <ma14:wrappingTextBoxFlag xmlns:ma14="http://schemas.microsoft.com/office/mac/drawingml/2011/main" xmlns="" val="1"/>
             </a:ext>
           </a:extLst>
         </p:spPr>
@@ -8572,7 +8572,7 @@
           </a:ln>
           <a:extLst>
             <a:ext uri="{C572A759-6A51-4108-AA02-DFA0A04FC94B}">
-              <ma14:wrappingTextBoxFlag xmlns="" xmlns:ma14="http://schemas.microsoft.com/office/mac/drawingml/2011/main" val="1"/>
+              <ma14:wrappingTextBoxFlag xmlns:ma14="http://schemas.microsoft.com/office/mac/drawingml/2011/main" xmlns="" val="1"/>
             </a:ext>
           </a:extLst>
         </p:spPr>
@@ -8703,7 +8703,7 @@
           </a:ln>
           <a:extLst>
             <a:ext uri="{C572A759-6A51-4108-AA02-DFA0A04FC94B}">
-              <ma14:wrappingTextBoxFlag xmlns="" xmlns:ma14="http://schemas.microsoft.com/office/mac/drawingml/2011/main" val="1"/>
+              <ma14:wrappingTextBoxFlag xmlns:ma14="http://schemas.microsoft.com/office/mac/drawingml/2011/main" xmlns="" val="1"/>
             </a:ext>
           </a:extLst>
         </p:spPr>
@@ -8812,7 +8812,7 @@
           </a:ln>
           <a:extLst>
             <a:ext uri="{C572A759-6A51-4108-AA02-DFA0A04FC94B}">
-              <ma14:wrappingTextBoxFlag xmlns="" xmlns:ma14="http://schemas.microsoft.com/office/mac/drawingml/2011/main" val="1"/>
+              <ma14:wrappingTextBoxFlag xmlns:ma14="http://schemas.microsoft.com/office/mac/drawingml/2011/main" xmlns="" val="1"/>
             </a:ext>
           </a:extLst>
         </p:spPr>
@@ -8943,7 +8943,7 @@
           </a:ln>
           <a:extLst>
             <a:ext uri="{C572A759-6A51-4108-AA02-DFA0A04FC94B}">
-              <ma14:wrappingTextBoxFlag xmlns="" xmlns:ma14="http://schemas.microsoft.com/office/mac/drawingml/2011/main" val="1"/>
+              <ma14:wrappingTextBoxFlag xmlns:ma14="http://schemas.microsoft.com/office/mac/drawingml/2011/main" xmlns="" val="1"/>
             </a:ext>
           </a:extLst>
         </p:spPr>
@@ -9074,7 +9074,7 @@
           </a:ln>
           <a:extLst>
             <a:ext uri="{C572A759-6A51-4108-AA02-DFA0A04FC94B}">
-              <ma14:wrappingTextBoxFlag xmlns="" xmlns:ma14="http://schemas.microsoft.com/office/mac/drawingml/2011/main" val="1"/>
+              <ma14:wrappingTextBoxFlag xmlns:ma14="http://schemas.microsoft.com/office/mac/drawingml/2011/main" xmlns="" val="1"/>
             </a:ext>
           </a:extLst>
         </p:spPr>
@@ -10669,7 +10669,7 @@
           </a:ln>
           <a:extLst>
             <a:ext uri="{C572A759-6A51-4108-AA02-DFA0A04FC94B}">
-              <ma14:wrappingTextBoxFlag xmlns="" xmlns:ma14="http://schemas.microsoft.com/office/mac/drawingml/2011/main" val="1"/>
+              <ma14:wrappingTextBoxFlag xmlns:ma14="http://schemas.microsoft.com/office/mac/drawingml/2011/main" xmlns="" val="1"/>
             </a:ext>
           </a:extLst>
         </p:spPr>
@@ -10778,7 +10778,7 @@
           </a:ln>
           <a:extLst>
             <a:ext uri="{C572A759-6A51-4108-AA02-DFA0A04FC94B}">
-              <ma14:wrappingTextBoxFlag xmlns="" xmlns:ma14="http://schemas.microsoft.com/office/mac/drawingml/2011/main" val="1"/>
+              <ma14:wrappingTextBoxFlag xmlns:ma14="http://schemas.microsoft.com/office/mac/drawingml/2011/main" xmlns="" val="1"/>
             </a:ext>
           </a:extLst>
         </p:spPr>
@@ -10870,7 +10870,7 @@
           </a:ln>
           <a:extLst>
             <a:ext uri="{C572A759-6A51-4108-AA02-DFA0A04FC94B}">
-              <ma14:wrappingTextBoxFlag xmlns="" xmlns:ma14="http://schemas.microsoft.com/office/mac/drawingml/2011/main" val="1"/>
+              <ma14:wrappingTextBoxFlag xmlns:ma14="http://schemas.microsoft.com/office/mac/drawingml/2011/main" xmlns="" val="1"/>
             </a:ext>
           </a:extLst>
         </p:spPr>
@@ -11113,7 +11113,7 @@
           </a:ln>
           <a:extLst>
             <a:ext uri="{C572A759-6A51-4108-AA02-DFA0A04FC94B}">
-              <ma14:wrappingTextBoxFlag xmlns="" xmlns:ma14="http://schemas.microsoft.com/office/mac/drawingml/2011/main" val="1"/>
+              <ma14:wrappingTextBoxFlag xmlns:ma14="http://schemas.microsoft.com/office/mac/drawingml/2011/main" xmlns="" val="1"/>
             </a:ext>
           </a:extLst>
         </p:spPr>
@@ -11239,7 +11239,7 @@
           </a:ln>
           <a:extLst>
             <a:ext uri="{C572A759-6A51-4108-AA02-DFA0A04FC94B}">
-              <ma14:wrappingTextBoxFlag xmlns="" xmlns:ma14="http://schemas.microsoft.com/office/mac/drawingml/2011/main" val="1"/>
+              <ma14:wrappingTextBoxFlag xmlns:ma14="http://schemas.microsoft.com/office/mac/drawingml/2011/main" xmlns="" val="1"/>
             </a:ext>
           </a:extLst>
         </p:spPr>
@@ -11286,7 +11286,7 @@
           </a:ln>
           <a:extLst>
             <a:ext uri="{C572A759-6A51-4108-AA02-DFA0A04FC94B}">
-              <ma14:wrappingTextBoxFlag xmlns="" xmlns:ma14="http://schemas.microsoft.com/office/mac/drawingml/2011/main" val="1"/>
+              <ma14:wrappingTextBoxFlag xmlns:ma14="http://schemas.microsoft.com/office/mac/drawingml/2011/main" xmlns="" val="1"/>
             </a:ext>
           </a:extLst>
         </p:spPr>
@@ -11413,7 +11413,7 @@
           </a:ln>
           <a:extLst>
             <a:ext uri="{C572A759-6A51-4108-AA02-DFA0A04FC94B}">
-              <ma14:wrappingTextBoxFlag xmlns="" xmlns:ma14="http://schemas.microsoft.com/office/mac/drawingml/2011/main" val="1"/>
+              <ma14:wrappingTextBoxFlag xmlns:ma14="http://schemas.microsoft.com/office/mac/drawingml/2011/main" xmlns="" val="1"/>
             </a:ext>
           </a:extLst>
         </p:spPr>
@@ -11684,7 +11684,7 @@
           </a:ln>
           <a:extLst>
             <a:ext uri="{C572A759-6A51-4108-AA02-DFA0A04FC94B}">
-              <ma14:wrappingTextBoxFlag xmlns="" xmlns:ma14="http://schemas.microsoft.com/office/mac/drawingml/2011/main" val="1"/>
+              <ma14:wrappingTextBoxFlag xmlns:ma14="http://schemas.microsoft.com/office/mac/drawingml/2011/main" xmlns="" val="1"/>
             </a:ext>
           </a:extLst>
         </p:spPr>
@@ -11731,7 +11731,7 @@
           </a:ln>
           <a:extLst>
             <a:ext uri="{C572A759-6A51-4108-AA02-DFA0A04FC94B}">
-              <ma14:wrappingTextBoxFlag xmlns="" xmlns:ma14="http://schemas.microsoft.com/office/mac/drawingml/2011/main" val="1"/>
+              <ma14:wrappingTextBoxFlag xmlns:ma14="http://schemas.microsoft.com/office/mac/drawingml/2011/main" xmlns="" val="1"/>
             </a:ext>
           </a:extLst>
         </p:spPr>
@@ -11858,7 +11858,7 @@
           </a:ln>
           <a:extLst>
             <a:ext uri="{C572A759-6A51-4108-AA02-DFA0A04FC94B}">
-              <ma14:wrappingTextBoxFlag xmlns="" xmlns:ma14="http://schemas.microsoft.com/office/mac/drawingml/2011/main" val="1"/>
+              <ma14:wrappingTextBoxFlag xmlns:ma14="http://schemas.microsoft.com/office/mac/drawingml/2011/main" xmlns="" val="1"/>
             </a:ext>
           </a:extLst>
         </p:spPr>
@@ -11940,16 +11940,14 @@
           </p:nvPr>
         </p:nvSpPr>
         <p:spPr>
-          <a:xfrm>
-            <a:off x="406400" y="1536700"/>
-            <a:ext cx="12192000" cy="1169261"/>
-          </a:xfrm>
-          <a:prstGeom prst="rect">
-            <a:avLst/>
-          </a:prstGeom>
-        </p:spPr>
-        <p:txBody>
-          <a:bodyPr/>
+          <a:prstGeom prst="rect">
+            <a:avLst/>
+          </a:prstGeom>
+        </p:spPr>
+        <p:txBody>
+          <a:bodyPr>
+            <a:normAutofit fontScale="90000"/>
+          </a:bodyPr>
           <a:lstStyle>
             <a:lvl1pPr defTabSz="403097">
               <a:spcBef>
@@ -11967,14 +11965,146 @@
       </p:sp>
       <p:sp>
         <p:nvSpPr>
-          <p:cNvPr id="398" name="Shape 398"/>
+          <p:cNvPr id="2" name="Text Placeholder 1">
+            <a:extLst>
+              <a:ext uri="{FF2B5EF4-FFF2-40B4-BE49-F238E27FC236}">
+                <a16:creationId xmlns:a16="http://schemas.microsoft.com/office/drawing/2014/main" id="{22080EE7-8D87-C87B-3333-4CBAC9FBC15C}"/>
+              </a:ext>
+            </a:extLst>
+          </p:cNvPr>
+          <p:cNvSpPr>
+            <a:spLocks noGrp="1"/>
+          </p:cNvSpPr>
+          <p:nvPr>
+            <p:ph type="body" sz="quarter" idx="10"/>
+          </p:nvPr>
+        </p:nvSpPr>
+        <p:spPr/>
+        <p:txBody>
+          <a:bodyPr/>
+          <a:lstStyle/>
+          <a:p>
+            <a:pPr marL="0" indent="0">
+              <a:spcBef>
+                <a:spcPts val="2800"/>
+              </a:spcBef>
+              <a:buNone/>
+            </a:pPr>
+            <a:r>
+              <a:rPr lang="en-US" i="0" dirty="0"/>
+              <a:t>English:</a:t>
+            </a:r>
+          </a:p>
+          <a:p>
+            <a:pPr marL="272821" lvl="1" indent="0">
+              <a:spcBef>
+                <a:spcPts val="2800"/>
+              </a:spcBef>
+              <a:buNone/>
+            </a:pPr>
+            <a:r>
+              <a:rPr lang="en-US" i="0" dirty="0"/>
+              <a:t>get the </a:t>
+            </a:r>
+            <a:r>
+              <a:rPr lang="en-US" i="0" dirty="0">
+                <a:solidFill>
+                  <a:srgbClr val="00B050"/>
+                </a:solidFill>
+              </a:rPr>
+              <a:t>third</a:t>
+            </a:r>
+            <a:r>
+              <a:rPr lang="en-US" i="0" dirty="0"/>
+              <a:t> to the </a:t>
+            </a:r>
+            <a:r>
+              <a:rPr lang="en-US" i="0" dirty="0">
+                <a:solidFill>
+                  <a:srgbClr val="00B050"/>
+                </a:solidFill>
+              </a:rPr>
+              <a:t>eleventh</a:t>
+            </a:r>
+            <a:r>
+              <a:rPr lang="en-US" i="0" dirty="0"/>
+              <a:t> elements of </a:t>
+            </a:r>
+            <a:r>
+              <a:rPr lang="en-US" i="0" dirty="0" err="1"/>
+              <a:t>my_string</a:t>
+            </a:r>
+            <a:endParaRPr lang="en-US" i="0" dirty="0"/>
+          </a:p>
+          <a:p>
+            <a:pPr marL="272821" lvl="1" indent="0">
+              <a:spcBef>
+                <a:spcPts val="2800"/>
+              </a:spcBef>
+              <a:buNone/>
+            </a:pPr>
+            <a:r>
+              <a:rPr lang="en-US" i="0" dirty="0"/>
+              <a:t>	or in other words</a:t>
+            </a:r>
+          </a:p>
+          <a:p>
+            <a:pPr marL="272821" lvl="1" indent="0">
+              <a:spcBef>
+                <a:spcPts val="2800"/>
+              </a:spcBef>
+              <a:buNone/>
+            </a:pPr>
+            <a:r>
+              <a:rPr lang="en-US" i="0" dirty="0"/>
+              <a:t>get the </a:t>
+            </a:r>
+            <a:r>
+              <a:rPr lang="en-US" i="0" dirty="0">
+                <a:solidFill>
+                  <a:srgbClr val="00B050"/>
+                </a:solidFill>
+              </a:rPr>
+              <a:t>fourth</a:t>
+            </a:r>
+            <a:r>
+              <a:rPr lang="en-US" i="0" dirty="0"/>
+              <a:t> letter to the </a:t>
+            </a:r>
+            <a:r>
+              <a:rPr lang="en-US" i="0" dirty="0">
+                <a:solidFill>
+                  <a:srgbClr val="00B050"/>
+                </a:solidFill>
+              </a:rPr>
+              <a:t>twelfth</a:t>
+            </a:r>
+            <a:r>
+              <a:rPr lang="en-US" i="0" dirty="0"/>
+              <a:t> letter</a:t>
+            </a:r>
+          </a:p>
+          <a:p>
+            <a:pPr marL="0" indent="0">
+              <a:spcBef>
+                <a:spcPts val="2800"/>
+              </a:spcBef>
+              <a:buNone/>
+            </a:pPr>
+            <a:endParaRPr lang="en-US" dirty="0"/>
+          </a:p>
+        </p:txBody>
+      </p:sp>
+      <p:sp>
+        <p:nvSpPr>
+          <p:cNvPr id="399" name="Shape 399"/>
           <p:cNvSpPr/>
           <p:nvPr/>
         </p:nvSpPr>
         <p:spPr>
           <a:xfrm>
-            <a:off x="439080" y="4072619"/>
-            <a:ext cx="2606499" cy="1041401"/>
+            <a:off x="519909" y="5322061"/>
+            <a:ext cx="12484891" cy="964367"/>
           </a:xfrm>
           <a:prstGeom prst="rect">
             <a:avLst/>
@@ -11984,54 +12114,7 @@
           </a:ln>
           <a:extLst>
             <a:ext uri="{C572A759-6A51-4108-AA02-DFA0A04FC94B}">
-              <ma14:wrappingTextBoxFlag xmlns="" xmlns:ma14="http://schemas.microsoft.com/office/mac/drawingml/2011/main" val="1"/>
-            </a:ext>
-          </a:extLst>
-        </p:spPr>
-        <p:txBody>
-          <a:bodyPr wrap="none" lIns="50800" tIns="50800" rIns="50800" bIns="50800" anchor="ctr">
-            <a:spAutoFit/>
-          </a:bodyPr>
-          <a:lstStyle>
-            <a:lvl1pPr>
-              <a:defRPr sz="5400">
-                <a:solidFill>
-                  <a:srgbClr val="838787"/>
-                </a:solidFill>
-                <a:latin typeface="Avenir Next"/>
-                <a:ea typeface="Avenir Next"/>
-                <a:cs typeface="Avenir Next"/>
-                <a:sym typeface="Avenir Next"/>
-              </a:defRPr>
-            </a:lvl1pPr>
-          </a:lstStyle>
-          <a:p>
-            <a:r>
-              <a:t>English:</a:t>
-            </a:r>
-          </a:p>
-        </p:txBody>
-      </p:sp>
-      <p:sp>
-        <p:nvSpPr>
-          <p:cNvPr id="399" name="Shape 399"/>
-          <p:cNvSpPr/>
-          <p:nvPr/>
-        </p:nvSpPr>
-        <p:spPr>
-          <a:xfrm>
-            <a:off x="513295" y="5102496"/>
-            <a:ext cx="12484891" cy="1826141"/>
-          </a:xfrm>
-          <a:prstGeom prst="rect">
-            <a:avLst/>
-          </a:prstGeom>
-          <a:ln w="12700">
-            <a:miter lim="400000"/>
-          </a:ln>
-          <a:extLst>
-            <a:ext uri="{C572A759-6A51-4108-AA02-DFA0A04FC94B}">
-              <ma14:wrappingTextBoxFlag xmlns="" xmlns:ma14="http://schemas.microsoft.com/office/mac/drawingml/2011/main" val="1"/>
+              <ma14:wrappingTextBoxFlag xmlns:ma14="http://schemas.microsoft.com/office/mac/drawingml/2011/main" xmlns="" val="1"/>
             </a:ext>
           </a:extLst>
         </p:spPr>
@@ -12053,43 +12136,7 @@
             </a:lvl1pPr>
           </a:lstStyle>
           <a:p>
-            <a:r>
-              <a:rPr dirty="0"/>
-              <a:t>get the </a:t>
-            </a:r>
-            <a:r>
-              <a:rPr lang="en-US" dirty="0">
-                <a:solidFill>
-                  <a:srgbClr val="00B050"/>
-                </a:solidFill>
-              </a:rPr>
-              <a:t>third</a:t>
-            </a:r>
-            <a:r>
-              <a:rPr lang="en-US" dirty="0"/>
-              <a:t> to the </a:t>
-            </a:r>
-            <a:r>
-              <a:rPr lang="en-US" dirty="0">
-                <a:solidFill>
-                  <a:srgbClr val="00B050"/>
-                </a:solidFill>
-              </a:rPr>
-              <a:t>twelfth</a:t>
-            </a:r>
-            <a:r>
-              <a:rPr lang="en-US" dirty="0"/>
-              <a:t> elements</a:t>
-            </a:r>
-            <a:r>
-              <a:rPr dirty="0"/>
-              <a:t> of </a:t>
-            </a:r>
-            <a:r>
-              <a:rPr dirty="0" err="1"/>
-              <a:t>my_string</a:t>
-            </a:r>
-            <a:endParaRPr dirty="0"/>
+            <a:endParaRPr i="0" dirty="0"/>
           </a:p>
         </p:txBody>
       </p:sp>
@@ -12404,7 +12451,7 @@
           </a:ln>
           <a:extLst>
             <a:ext uri="{C572A759-6A51-4108-AA02-DFA0A04FC94B}">
-              <ma14:wrappingTextBoxFlag xmlns="" xmlns:ma14="http://schemas.microsoft.com/office/mac/drawingml/2011/main" val="1"/>
+              <ma14:wrappingTextBoxFlag xmlns:ma14="http://schemas.microsoft.com/office/mac/drawingml/2011/main" xmlns="" val="1"/>
             </a:ext>
           </a:extLst>
         </p:spPr>
@@ -12513,7 +12560,7 @@
           </a:ln>
           <a:extLst>
             <a:ext uri="{C572A759-6A51-4108-AA02-DFA0A04FC94B}">
-              <ma14:wrappingTextBoxFlag xmlns="" xmlns:ma14="http://schemas.microsoft.com/office/mac/drawingml/2011/main" val="1"/>
+              <ma14:wrappingTextBoxFlag xmlns:ma14="http://schemas.microsoft.com/office/mac/drawingml/2011/main" xmlns="" val="1"/>
             </a:ext>
           </a:extLst>
         </p:spPr>
@@ -12560,7 +12607,7 @@
           </a:ln>
           <a:extLst>
             <a:ext uri="{C572A759-6A51-4108-AA02-DFA0A04FC94B}">
-              <ma14:wrappingTextBoxFlag xmlns="" xmlns:ma14="http://schemas.microsoft.com/office/mac/drawingml/2011/main" val="1"/>
+              <ma14:wrappingTextBoxFlag xmlns:ma14="http://schemas.microsoft.com/office/mac/drawingml/2011/main" xmlns="" val="1"/>
             </a:ext>
           </a:extLst>
         </p:spPr>
@@ -12812,7 +12859,7 @@
           </a:ln>
           <a:extLst>
             <a:ext uri="{C572A759-6A51-4108-AA02-DFA0A04FC94B}">
-              <ma14:wrappingTextBoxFlag xmlns="" xmlns:ma14="http://schemas.microsoft.com/office/mac/drawingml/2011/main" val="1"/>
+              <ma14:wrappingTextBoxFlag xmlns:ma14="http://schemas.microsoft.com/office/mac/drawingml/2011/main" xmlns="" val="1"/>
             </a:ext>
           </a:extLst>
         </p:spPr>
@@ -12859,7 +12906,7 @@
           </a:ln>
           <a:extLst>
             <a:ext uri="{C572A759-6A51-4108-AA02-DFA0A04FC94B}">
-              <ma14:wrappingTextBoxFlag xmlns="" xmlns:ma14="http://schemas.microsoft.com/office/mac/drawingml/2011/main" val="1"/>
+              <ma14:wrappingTextBoxFlag xmlns:ma14="http://schemas.microsoft.com/office/mac/drawingml/2011/main" xmlns="" val="1"/>
             </a:ext>
           </a:extLst>
         </p:spPr>
@@ -12989,7 +13036,7 @@
           </a:ln>
           <a:extLst>
             <a:ext uri="{C572A759-6A51-4108-AA02-DFA0A04FC94B}">
-              <ma14:wrappingTextBoxFlag xmlns="" xmlns:ma14="http://schemas.microsoft.com/office/mac/drawingml/2011/main" val="1"/>
+              <ma14:wrappingTextBoxFlag xmlns:ma14="http://schemas.microsoft.com/office/mac/drawingml/2011/main" xmlns="" val="1"/>
             </a:ext>
           </a:extLst>
         </p:spPr>
@@ -13098,7 +13145,7 @@
           </a:ln>
           <a:extLst>
             <a:ext uri="{C572A759-6A51-4108-AA02-DFA0A04FC94B}">
-              <ma14:wrappingTextBoxFlag xmlns="" xmlns:ma14="http://schemas.microsoft.com/office/mac/drawingml/2011/main" val="1"/>
+              <ma14:wrappingTextBoxFlag xmlns:ma14="http://schemas.microsoft.com/office/mac/drawingml/2011/main" xmlns="" val="1"/>
             </a:ext>
           </a:extLst>
         </p:spPr>
@@ -13217,7 +13264,7 @@
           </a:ln>
           <a:extLst>
             <a:ext uri="{C572A759-6A51-4108-AA02-DFA0A04FC94B}">
-              <ma14:wrappingTextBoxFlag xmlns="" xmlns:ma14="http://schemas.microsoft.com/office/mac/drawingml/2011/main" val="1"/>
+              <ma14:wrappingTextBoxFlag xmlns:ma14="http://schemas.microsoft.com/office/mac/drawingml/2011/main" xmlns="" val="1"/>
             </a:ext>
           </a:extLst>
         </p:spPr>
@@ -13319,7 +13366,7 @@
           </a:ln>
           <a:extLst>
             <a:ext uri="{C572A759-6A51-4108-AA02-DFA0A04FC94B}">
-              <ma14:wrappingTextBoxFlag xmlns="" xmlns:ma14="http://schemas.microsoft.com/office/mac/drawingml/2011/main" val="1"/>
+              <ma14:wrappingTextBoxFlag xmlns:ma14="http://schemas.microsoft.com/office/mac/drawingml/2011/main" xmlns="" val="1"/>
             </a:ext>
           </a:extLst>
         </p:spPr>
@@ -13527,7 +13574,7 @@
           </a:ln>
           <a:extLst>
             <a:ext uri="{C572A759-6A51-4108-AA02-DFA0A04FC94B}">
-              <ma14:wrappingTextBoxFlag xmlns="" xmlns:ma14="http://schemas.microsoft.com/office/mac/drawingml/2011/main" val="1"/>
+              <ma14:wrappingTextBoxFlag xmlns:ma14="http://schemas.microsoft.com/office/mac/drawingml/2011/main" xmlns="" val="1"/>
             </a:ext>
           </a:extLst>
         </p:spPr>
@@ -13640,7 +13687,7 @@
           </a:ln>
           <a:extLst>
             <a:ext uri="{C572A759-6A51-4108-AA02-DFA0A04FC94B}">
-              <ma14:wrappingTextBoxFlag xmlns="" xmlns:ma14="http://schemas.microsoft.com/office/mac/drawingml/2011/main" val="1"/>
+              <ma14:wrappingTextBoxFlag xmlns:ma14="http://schemas.microsoft.com/office/mac/drawingml/2011/main" xmlns="" val="1"/>
             </a:ext>
           </a:extLst>
         </p:spPr>
@@ -13749,7 +13796,7 @@
           </a:ln>
           <a:extLst>
             <a:ext uri="{C572A759-6A51-4108-AA02-DFA0A04FC94B}">
-              <ma14:wrappingTextBoxFlag xmlns="" xmlns:ma14="http://schemas.microsoft.com/office/mac/drawingml/2011/main" val="1"/>
+              <ma14:wrappingTextBoxFlag xmlns:ma14="http://schemas.microsoft.com/office/mac/drawingml/2011/main" xmlns="" val="1"/>
             </a:ext>
           </a:extLst>
         </p:spPr>
@@ -13851,7 +13898,7 @@
           </a:ln>
           <a:extLst>
             <a:ext uri="{C572A759-6A51-4108-AA02-DFA0A04FC94B}">
-              <ma14:wrappingTextBoxFlag xmlns="" xmlns:ma14="http://schemas.microsoft.com/office/mac/drawingml/2011/main" val="1"/>
+              <ma14:wrappingTextBoxFlag xmlns:ma14="http://schemas.microsoft.com/office/mac/drawingml/2011/main" xmlns="" val="1"/>
             </a:ext>
           </a:extLst>
         </p:spPr>
@@ -14100,7 +14147,7 @@
           </a:ln>
           <a:extLst>
             <a:ext uri="{C572A759-6A51-4108-AA02-DFA0A04FC94B}">
-              <ma14:wrappingTextBoxFlag xmlns="" xmlns:ma14="http://schemas.microsoft.com/office/mac/drawingml/2011/main" val="1"/>
+              <ma14:wrappingTextBoxFlag xmlns:ma14="http://schemas.microsoft.com/office/mac/drawingml/2011/main" xmlns="" val="1"/>
             </a:ext>
           </a:extLst>
         </p:spPr>
@@ -14290,7 +14337,7 @@
           </a:ln>
           <a:extLst>
             <a:ext uri="{C572A759-6A51-4108-AA02-DFA0A04FC94B}">
-              <ma14:wrappingTextBoxFlag xmlns="" xmlns:ma14="http://schemas.microsoft.com/office/mac/drawingml/2011/main" val="1"/>
+              <ma14:wrappingTextBoxFlag xmlns:ma14="http://schemas.microsoft.com/office/mac/drawingml/2011/main" xmlns="" val="1"/>
             </a:ext>
           </a:extLst>
         </p:spPr>
@@ -14427,7 +14474,7 @@
           </a:ln>
           <a:extLst>
             <a:ext uri="{C572A759-6A51-4108-AA02-DFA0A04FC94B}">
-              <ma14:wrappingTextBoxFlag xmlns="" xmlns:ma14="http://schemas.microsoft.com/office/mac/drawingml/2011/main" val="1"/>
+              <ma14:wrappingTextBoxFlag xmlns:ma14="http://schemas.microsoft.com/office/mac/drawingml/2011/main" xmlns="" val="1"/>
             </a:ext>
           </a:extLst>
         </p:spPr>
@@ -14633,7 +14680,7 @@
           </a:ln>
           <a:extLst>
             <a:ext uri="{C572A759-6A51-4108-AA02-DFA0A04FC94B}">
-              <ma14:wrappingTextBoxFlag xmlns="" xmlns:ma14="http://schemas.microsoft.com/office/mac/drawingml/2011/main" val="1"/>
+              <ma14:wrappingTextBoxFlag xmlns:ma14="http://schemas.microsoft.com/office/mac/drawingml/2011/main" xmlns="" val="1"/>
             </a:ext>
           </a:extLst>
         </p:spPr>
@@ -14764,7 +14811,7 @@
           </a:ln>
           <a:extLst>
             <a:ext uri="{C572A759-6A51-4108-AA02-DFA0A04FC94B}">
-              <ma14:wrappingTextBoxFlag xmlns="" xmlns:ma14="http://schemas.microsoft.com/office/mac/drawingml/2011/main" val="1"/>
+              <ma14:wrappingTextBoxFlag xmlns:ma14="http://schemas.microsoft.com/office/mac/drawingml/2011/main" xmlns="" val="1"/>
             </a:ext>
           </a:extLst>
         </p:spPr>
@@ -15098,7 +15145,7 @@
           </a:ln>
           <a:extLst>
             <a:ext uri="{C572A759-6A51-4108-AA02-DFA0A04FC94B}">
-              <ma14:wrappingTextBoxFlag xmlns="" xmlns:ma14="http://schemas.microsoft.com/office/mac/drawingml/2011/main" val="1"/>
+              <ma14:wrappingTextBoxFlag xmlns:ma14="http://schemas.microsoft.com/office/mac/drawingml/2011/main" xmlns="" val="1"/>
             </a:ext>
           </a:extLst>
         </p:spPr>
@@ -15207,7 +15254,7 @@
           </a:ln>
           <a:extLst>
             <a:ext uri="{C572A759-6A51-4108-AA02-DFA0A04FC94B}">
-              <ma14:wrappingTextBoxFlag xmlns="" xmlns:ma14="http://schemas.microsoft.com/office/mac/drawingml/2011/main" val="1"/>
+              <ma14:wrappingTextBoxFlag xmlns:ma14="http://schemas.microsoft.com/office/mac/drawingml/2011/main" xmlns="" val="1"/>
             </a:ext>
           </a:extLst>
         </p:spPr>
@@ -15427,7 +15474,7 @@
           </a:ln>
           <a:extLst>
             <a:ext uri="{C572A759-6A51-4108-AA02-DFA0A04FC94B}">
-              <ma14:wrappingTextBoxFlag xmlns="" xmlns:ma14="http://schemas.microsoft.com/office/mac/drawingml/2011/main" val="1"/>
+              <ma14:wrappingTextBoxFlag xmlns:ma14="http://schemas.microsoft.com/office/mac/drawingml/2011/main" xmlns="" val="1"/>
             </a:ext>
           </a:extLst>
         </p:spPr>
@@ -15519,7 +15566,7 @@
           </a:ln>
           <a:extLst>
             <a:ext uri="{C572A759-6A51-4108-AA02-DFA0A04FC94B}">
-              <ma14:wrappingTextBoxFlag xmlns="" xmlns:ma14="http://schemas.microsoft.com/office/mac/drawingml/2011/main" val="1"/>
+              <ma14:wrappingTextBoxFlag xmlns:ma14="http://schemas.microsoft.com/office/mac/drawingml/2011/main" xmlns="" val="1"/>
             </a:ext>
           </a:extLst>
         </p:spPr>
@@ -15715,7 +15762,7 @@
           </a:ln>
           <a:extLst>
             <a:ext uri="{C572A759-6A51-4108-AA02-DFA0A04FC94B}">
-              <ma14:wrappingTextBoxFlag xmlns="" xmlns:ma14="http://schemas.microsoft.com/office/mac/drawingml/2011/main" val="1"/>
+              <ma14:wrappingTextBoxFlag xmlns:ma14="http://schemas.microsoft.com/office/mac/drawingml/2011/main" xmlns="" val="1"/>
             </a:ext>
           </a:extLst>
         </p:spPr>
@@ -15836,7 +15883,7 @@
           </a:ln>
           <a:extLst>
             <a:ext uri="{C572A759-6A51-4108-AA02-DFA0A04FC94B}">
-              <ma14:wrappingTextBoxFlag xmlns="" xmlns:ma14="http://schemas.microsoft.com/office/mac/drawingml/2011/main" val="1"/>
+              <ma14:wrappingTextBoxFlag xmlns:ma14="http://schemas.microsoft.com/office/mac/drawingml/2011/main" xmlns="" val="1"/>
             </a:ext>
           </a:extLst>
         </p:spPr>
@@ -15933,7 +15980,7 @@
           </a:ln>
           <a:extLst>
             <a:ext uri="{C572A759-6A51-4108-AA02-DFA0A04FC94B}">
-              <ma14:wrappingTextBoxFlag xmlns="" xmlns:ma14="http://schemas.microsoft.com/office/mac/drawingml/2011/main" val="1"/>
+              <ma14:wrappingTextBoxFlag xmlns:ma14="http://schemas.microsoft.com/office/mac/drawingml/2011/main" xmlns="" val="1"/>
             </a:ext>
           </a:extLst>
         </p:spPr>
@@ -16042,7 +16089,7 @@
           </a:ln>
           <a:extLst>
             <a:ext uri="{C572A759-6A51-4108-AA02-DFA0A04FC94B}">
-              <ma14:wrappingTextBoxFlag xmlns="" xmlns:ma14="http://schemas.microsoft.com/office/mac/drawingml/2011/main" val="1"/>
+              <ma14:wrappingTextBoxFlag xmlns:ma14="http://schemas.microsoft.com/office/mac/drawingml/2011/main" xmlns="" val="1"/>
             </a:ext>
           </a:extLst>
         </p:spPr>
@@ -16096,7 +16143,7 @@
           </a:ln>
           <a:extLst>
             <a:ext uri="{C572A759-6A51-4108-AA02-DFA0A04FC94B}">
-              <ma14:wrappingTextBoxFlag xmlns="" xmlns:ma14="http://schemas.microsoft.com/office/mac/drawingml/2011/main" val="1"/>
+              <ma14:wrappingTextBoxFlag xmlns:ma14="http://schemas.microsoft.com/office/mac/drawingml/2011/main" xmlns="" val="1"/>
             </a:ext>
           </a:extLst>
         </p:spPr>
@@ -16346,7 +16393,7 @@
           </a:ln>
           <a:extLst>
             <a:ext uri="{C572A759-6A51-4108-AA02-DFA0A04FC94B}">
-              <ma14:wrappingTextBoxFlag xmlns="" xmlns:ma14="http://schemas.microsoft.com/office/mac/drawingml/2011/main" val="1"/>
+              <ma14:wrappingTextBoxFlag xmlns:ma14="http://schemas.microsoft.com/office/mac/drawingml/2011/main" xmlns="" val="1"/>
             </a:ext>
           </a:extLst>
         </p:spPr>
@@ -16455,7 +16502,7 @@
           </a:ln>
           <a:extLst>
             <a:ext uri="{C572A759-6A51-4108-AA02-DFA0A04FC94B}">
-              <ma14:wrappingTextBoxFlag xmlns="" xmlns:ma14="http://schemas.microsoft.com/office/mac/drawingml/2011/main" val="1"/>
+              <ma14:wrappingTextBoxFlag xmlns:ma14="http://schemas.microsoft.com/office/mac/drawingml/2011/main" xmlns="" val="1"/>
             </a:ext>
           </a:extLst>
         </p:spPr>
@@ -16502,7 +16549,7 @@
           </a:ln>
           <a:extLst>
             <a:ext uri="{C572A759-6A51-4108-AA02-DFA0A04FC94B}">
-              <ma14:wrappingTextBoxFlag xmlns="" xmlns:ma14="http://schemas.microsoft.com/office/mac/drawingml/2011/main" val="1"/>
+              <ma14:wrappingTextBoxFlag xmlns:ma14="http://schemas.microsoft.com/office/mac/drawingml/2011/main" xmlns="" val="1"/>
             </a:ext>
           </a:extLst>
         </p:spPr>
@@ -16594,7 +16641,7 @@
           </a:ln>
           <a:extLst>
             <a:ext uri="{C572A759-6A51-4108-AA02-DFA0A04FC94B}">
-              <ma14:wrappingTextBoxFlag xmlns="" xmlns:ma14="http://schemas.microsoft.com/office/mac/drawingml/2011/main" val="1"/>
+              <ma14:wrappingTextBoxFlag xmlns:ma14="http://schemas.microsoft.com/office/mac/drawingml/2011/main" xmlns="" val="1"/>
             </a:ext>
           </a:extLst>
         </p:spPr>
@@ -16703,7 +16750,7 @@
           </a:ln>
           <a:extLst>
             <a:ext uri="{C572A759-6A51-4108-AA02-DFA0A04FC94B}">
-              <ma14:wrappingTextBoxFlag xmlns="" xmlns:ma14="http://schemas.microsoft.com/office/mac/drawingml/2011/main" val="1"/>
+              <ma14:wrappingTextBoxFlag xmlns:ma14="http://schemas.microsoft.com/office/mac/drawingml/2011/main" xmlns="" val="1"/>
             </a:ext>
           </a:extLst>
         </p:spPr>
@@ -16750,7 +16797,7 @@
           </a:ln>
           <a:extLst>
             <a:ext uri="{C572A759-6A51-4108-AA02-DFA0A04FC94B}">
-              <ma14:wrappingTextBoxFlag xmlns="" xmlns:ma14="http://schemas.microsoft.com/office/mac/drawingml/2011/main" val="1"/>
+              <ma14:wrappingTextBoxFlag xmlns:ma14="http://schemas.microsoft.com/office/mac/drawingml/2011/main" xmlns="" val="1"/>
             </a:ext>
           </a:extLst>
         </p:spPr>
@@ -16842,7 +16889,7 @@
           </a:ln>
           <a:extLst>
             <a:ext uri="{C572A759-6A51-4108-AA02-DFA0A04FC94B}">
-              <ma14:wrappingTextBoxFlag xmlns="" xmlns:ma14="http://schemas.microsoft.com/office/mac/drawingml/2011/main" val="1"/>
+              <ma14:wrappingTextBoxFlag xmlns:ma14="http://schemas.microsoft.com/office/mac/drawingml/2011/main" xmlns="" val="1"/>
             </a:ext>
           </a:extLst>
         </p:spPr>
@@ -16934,7 +16981,7 @@
           </a:ln>
           <a:extLst>
             <a:ext uri="{C572A759-6A51-4108-AA02-DFA0A04FC94B}">
-              <ma14:wrappingTextBoxFlag xmlns="" xmlns:ma14="http://schemas.microsoft.com/office/mac/drawingml/2011/main" val="1"/>
+              <ma14:wrappingTextBoxFlag xmlns:ma14="http://schemas.microsoft.com/office/mac/drawingml/2011/main" xmlns="" val="1"/>
             </a:ext>
           </a:extLst>
         </p:spPr>

</xml_diff>